<commit_message>
fix: sections 1 through 5, and dev methodology
</commit_message>
<xml_diff>
--- a/Documents/Poster Capstone_Hiriart Corales Samaniego.pptx
+++ b/Documents/Poster Capstone_Hiriart Corales Samaniego.pptx
@@ -255,7 +255,7 @@
           <a:p>
             <a:fld id="{12C71A99-0B13-4396-9EE6-7D91949CF6D1}" type="datetimeFigureOut">
               <a:rPr lang="es-EC" smtClean="0"/>
-              <a:t>23/7/2023</a:t>
+              <a:t>28/7/2023</a:t>
             </a:fld>
             <a:endParaRPr lang="es-EC"/>
           </a:p>
@@ -425,7 +425,7 @@
           <a:p>
             <a:fld id="{12C71A99-0B13-4396-9EE6-7D91949CF6D1}" type="datetimeFigureOut">
               <a:rPr lang="es-EC" smtClean="0"/>
-              <a:t>23/7/2023</a:t>
+              <a:t>28/7/2023</a:t>
             </a:fld>
             <a:endParaRPr lang="es-EC"/>
           </a:p>
@@ -605,7 +605,7 @@
           <a:p>
             <a:fld id="{12C71A99-0B13-4396-9EE6-7D91949CF6D1}" type="datetimeFigureOut">
               <a:rPr lang="es-EC" smtClean="0"/>
-              <a:t>23/7/2023</a:t>
+              <a:t>28/7/2023</a:t>
             </a:fld>
             <a:endParaRPr lang="es-EC"/>
           </a:p>
@@ -775,7 +775,7 @@
           <a:p>
             <a:fld id="{12C71A99-0B13-4396-9EE6-7D91949CF6D1}" type="datetimeFigureOut">
               <a:rPr lang="es-EC" smtClean="0"/>
-              <a:t>23/7/2023</a:t>
+              <a:t>28/7/2023</a:t>
             </a:fld>
             <a:endParaRPr lang="es-EC"/>
           </a:p>
@@ -1021,7 +1021,7 @@
           <a:p>
             <a:fld id="{12C71A99-0B13-4396-9EE6-7D91949CF6D1}" type="datetimeFigureOut">
               <a:rPr lang="es-EC" smtClean="0"/>
-              <a:t>23/7/2023</a:t>
+              <a:t>28/7/2023</a:t>
             </a:fld>
             <a:endParaRPr lang="es-EC"/>
           </a:p>
@@ -1253,7 +1253,7 @@
           <a:p>
             <a:fld id="{12C71A99-0B13-4396-9EE6-7D91949CF6D1}" type="datetimeFigureOut">
               <a:rPr lang="es-EC" smtClean="0"/>
-              <a:t>23/7/2023</a:t>
+              <a:t>28/7/2023</a:t>
             </a:fld>
             <a:endParaRPr lang="es-EC"/>
           </a:p>
@@ -1620,7 +1620,7 @@
           <a:p>
             <a:fld id="{12C71A99-0B13-4396-9EE6-7D91949CF6D1}" type="datetimeFigureOut">
               <a:rPr lang="es-EC" smtClean="0"/>
-              <a:t>23/7/2023</a:t>
+              <a:t>28/7/2023</a:t>
             </a:fld>
             <a:endParaRPr lang="es-EC"/>
           </a:p>
@@ -1738,7 +1738,7 @@
           <a:p>
             <a:fld id="{12C71A99-0B13-4396-9EE6-7D91949CF6D1}" type="datetimeFigureOut">
               <a:rPr lang="es-EC" smtClean="0"/>
-              <a:t>23/7/2023</a:t>
+              <a:t>28/7/2023</a:t>
             </a:fld>
             <a:endParaRPr lang="es-EC"/>
           </a:p>
@@ -1833,7 +1833,7 @@
           <a:p>
             <a:fld id="{12C71A99-0B13-4396-9EE6-7D91949CF6D1}" type="datetimeFigureOut">
               <a:rPr lang="es-EC" smtClean="0"/>
-              <a:t>23/7/2023</a:t>
+              <a:t>28/7/2023</a:t>
             </a:fld>
             <a:endParaRPr lang="es-EC"/>
           </a:p>
@@ -2110,7 +2110,7 @@
           <a:p>
             <a:fld id="{12C71A99-0B13-4396-9EE6-7D91949CF6D1}" type="datetimeFigureOut">
               <a:rPr lang="es-EC" smtClean="0"/>
-              <a:t>23/7/2023</a:t>
+              <a:t>28/7/2023</a:t>
             </a:fld>
             <a:endParaRPr lang="es-EC"/>
           </a:p>
@@ -2367,7 +2367,7 @@
           <a:p>
             <a:fld id="{12C71A99-0B13-4396-9EE6-7D91949CF6D1}" type="datetimeFigureOut">
               <a:rPr lang="es-EC" smtClean="0"/>
-              <a:t>23/7/2023</a:t>
+              <a:t>28/7/2023</a:t>
             </a:fld>
             <a:endParaRPr lang="es-EC"/>
           </a:p>
@@ -2580,7 +2580,7 @@
           <a:p>
             <a:fld id="{12C71A99-0B13-4396-9EE6-7D91949CF6D1}" type="datetimeFigureOut">
               <a:rPr lang="es-EC" smtClean="0"/>
-              <a:t>23/7/2023</a:t>
+              <a:t>28/7/2023</a:t>
             </a:fld>
             <a:endParaRPr lang="es-EC"/>
           </a:p>
@@ -3193,7 +3193,7 @@
           <a:p>
             <a:pPr algn="just" defTabSz="189189"/>
             <a:r>
-              <a:rPr lang="es-EC" sz="3200">
+              <a:rPr lang="es-EC" sz="3200" dirty="0">
                 <a:solidFill>
                   <a:srgbClr val="000000"/>
                 </a:solidFill>
@@ -3508,7 +3508,7 @@
         </p:nvSpPr>
         <p:spPr>
           <a:xfrm>
-            <a:off x="1502940" y="8605106"/>
+            <a:off x="1502940" y="8499599"/>
             <a:ext cx="13860000" cy="1969770"/>
           </a:xfrm>
           <a:prstGeom prst="rect">
@@ -3524,14 +3524,24 @@
           <a:p>
             <a:pPr algn="just"/>
             <a:r>
-              <a:rPr lang="es-ES" sz="3200">
+              <a:rPr lang="es-EC" sz="3200" dirty="0">
                 <a:solidFill>
                   <a:srgbClr val="000000"/>
                 </a:solidFill>
                 <a:latin typeface="Calibri"/>
                 <a:cs typeface="Calibri"/>
               </a:rPr>
-              <a:t>Desarrollar una aplicación web para la Academia de Esgrima Ciudad de Quito, la cual permita la gestión de datos de entrenamiento, la aplicación se apoyará de una inteligencia artificial para detección de posibles errores en entrenamientos, y una máquina de conteo de puntaje para combates.</a:t>
+              <a:t>Desarrollar una aplicación web, con un módulo de inteligencia artificial que detecte posibles errores, y una máquina de puntaje con temporizador, para apoyar la gestión de datos de entrenamiento de esgrima en la Academia de Esgrima Ciudad de Quito</a:t>
+            </a:r>
+            <a:r>
+              <a:rPr lang="es-ES" sz="3200" dirty="0">
+                <a:solidFill>
+                  <a:srgbClr val="000000"/>
+                </a:solidFill>
+                <a:latin typeface="Calibri"/>
+                <a:cs typeface="Calibri"/>
+              </a:rPr>
+              <a:t>.</a:t>
             </a:r>
           </a:p>
         </p:txBody>
@@ -5968,7 +5978,7 @@
         <p:spPr>
           <a:xfrm>
             <a:off x="1467395" y="8542891"/>
-            <a:ext cx="13860000" cy="1969770"/>
+            <a:ext cx="13860000" cy="1477328"/>
           </a:xfrm>
           <a:prstGeom prst="rect">
             <a:avLst/>
@@ -5987,7 +5997,7 @@
                 <a:ea typeface="+mn-lt"/>
                 <a:cs typeface="+mn-lt"/>
               </a:rPr>
-              <a:t>Develop a web application for </a:t>
+              <a:t>Develop a web application, with an artificial intelligence module that detects possible errors, and a scoring machine with a timer, in order to support the management of fencing training data for </a:t>
             </a:r>
             <a:r>
               <a:rPr lang="en-US" sz="3200" i="1" dirty="0">
@@ -6008,14 +6018,14 @@
                 <a:ea typeface="+mn-lt"/>
                 <a:cs typeface="+mn-lt"/>
               </a:rPr>
-              <a:t> ciudad de Quito</a:t>
+              <a:t> Ciudad de Quito</a:t>
             </a:r>
             <a:r>
               <a:rPr lang="en-US" sz="3200" dirty="0">
                 <a:ea typeface="+mn-lt"/>
                 <a:cs typeface="+mn-lt"/>
               </a:rPr>
-              <a:t>, which allows the management of training data, the application will be supported by artificial intelligence to detect possible errors in training, and a score keeping machine for combats.</a:t>
+              <a:t>.</a:t>
             </a:r>
             <a:endParaRPr lang="en-US" sz="3200" dirty="0">
               <a:ea typeface="Calibri"/>
@@ -8596,23 +8606,6 @@
 </file>
 
 <file path=customXml/item1.xml><?xml version="1.0" encoding="utf-8"?>
-<?mso-contentType ?>
-<FormTemplates xmlns="http://schemas.microsoft.com/sharepoint/v3/contenttype/forms">
-  <Display>DocumentLibraryForm</Display>
-  <Edit>DocumentLibraryForm</Edit>
-  <New>DocumentLibraryForm</New>
-</FormTemplates>
-</file>
-
-<file path=customXml/item2.xml><?xml version="1.0" encoding="utf-8"?>
-<p:properties xmlns:p="http://schemas.microsoft.com/office/2006/metadata/properties" xmlns:xsi="http://www.w3.org/2001/XMLSchema-instance" xmlns:pc="http://schemas.microsoft.com/office/infopath/2007/PartnerControls">
-  <documentManagement>
-    <_activity xmlns="8b5aa52d-55c6-460f-b140-7d1036289c34" xsi:nil="true"/>
-  </documentManagement>
-</p:properties>
-</file>
-
-<file path=customXml/item3.xml><?xml version="1.0" encoding="utf-8"?>
 <ct:contentTypeSchema xmlns:ct="http://schemas.microsoft.com/office/2006/metadata/contentType" xmlns:ma="http://schemas.microsoft.com/office/2006/metadata/properties/metaAttributes" ct:_="" ma:_="" ma:contentTypeName="Document" ma:contentTypeID="0x0101005607B7EB9064FA4898B578FABE8FD918" ma:contentTypeVersion="16" ma:contentTypeDescription="Create a new document." ma:contentTypeScope="" ma:versionID="56d91f5f361719270891a2c0e8fd174b">
   <xsd:schema xmlns:xsd="http://www.w3.org/2001/XMLSchema" xmlns:xs="http://www.w3.org/2001/XMLSchema" xmlns:p="http://schemas.microsoft.com/office/2006/metadata/properties" xmlns:ns3="8b5aa52d-55c6-460f-b140-7d1036289c34" xmlns:ns4="a7a475fa-823d-4b6d-a5c9-7ed2d4452183" targetNamespace="http://schemas.microsoft.com/office/2006/metadata/properties" ma:root="true" ma:fieldsID="0e5a20e0752b682dcd58fb649d4a297c" ns3:_="" ns4:_="">
     <xsd:import namespace="8b5aa52d-55c6-460f-b140-7d1036289c34"/>
@@ -8853,32 +8846,24 @@
 </ct:contentTypeSchema>
 </file>
 
-<file path=customXml/itemProps1.xml><?xml version="1.0" encoding="utf-8"?>
-<ds:datastoreItem xmlns:ds="http://schemas.openxmlformats.org/officeDocument/2006/customXml" ds:itemID="{92EFAD2A-D7B7-489C-B42D-5915B3A4998D}">
-  <ds:schemaRefs>
-    <ds:schemaRef ds:uri="http://schemas.microsoft.com/sharepoint/v3/contenttype/forms"/>
-  </ds:schemaRefs>
-</ds:datastoreItem>
+<file path=customXml/item2.xml><?xml version="1.0" encoding="utf-8"?>
+<p:properties xmlns:p="http://schemas.microsoft.com/office/2006/metadata/properties" xmlns:xsi="http://www.w3.org/2001/XMLSchema-instance" xmlns:pc="http://schemas.microsoft.com/office/infopath/2007/PartnerControls">
+  <documentManagement>
+    <_activity xmlns="8b5aa52d-55c6-460f-b140-7d1036289c34" xsi:nil="true"/>
+  </documentManagement>
+</p:properties>
 </file>
 
-<file path=customXml/itemProps2.xml><?xml version="1.0" encoding="utf-8"?>
-<ds:datastoreItem xmlns:ds="http://schemas.openxmlformats.org/officeDocument/2006/customXml" ds:itemID="{4CC2EA12-2FBF-44D3-A23A-46F0D23AD439}">
-  <ds:schemaRefs>
-    <ds:schemaRef ds:uri="8b5aa52d-55c6-460f-b140-7d1036289c34"/>
-    <ds:schemaRef ds:uri="http://schemas.openxmlformats.org/package/2006/metadata/core-properties"/>
-    <ds:schemaRef ds:uri="http://purl.org/dc/elements/1.1/"/>
-    <ds:schemaRef ds:uri="http://purl.org/dc/terms/"/>
-    <ds:schemaRef ds:uri="http://schemas.microsoft.com/office/2006/metadata/properties"/>
-    <ds:schemaRef ds:uri="http://purl.org/dc/dcmitype/"/>
-    <ds:schemaRef ds:uri="http://schemas.microsoft.com/office/2006/documentManagement/types"/>
-    <ds:schemaRef ds:uri="http://schemas.microsoft.com/office/infopath/2007/PartnerControls"/>
-    <ds:schemaRef ds:uri="a7a475fa-823d-4b6d-a5c9-7ed2d4452183"/>
-    <ds:schemaRef ds:uri="http://www.w3.org/XML/1998/namespace"/>
-  </ds:schemaRefs>
-</ds:datastoreItem>
+<file path=customXml/item3.xml><?xml version="1.0" encoding="utf-8"?>
+<?mso-contentType ?>
+<FormTemplates xmlns="http://schemas.microsoft.com/sharepoint/v3/contenttype/forms">
+  <Display>DocumentLibraryForm</Display>
+  <Edit>DocumentLibraryForm</Edit>
+  <New>DocumentLibraryForm</New>
+</FormTemplates>
 </file>
 
-<file path=customXml/itemProps3.xml><?xml version="1.0" encoding="utf-8"?>
+<file path=customXml/itemProps1.xml><?xml version="1.0" encoding="utf-8"?>
 <ds:datastoreItem xmlns:ds="http://schemas.openxmlformats.org/officeDocument/2006/customXml" ds:itemID="{3C36E779-9115-4C7F-AFBC-2B265042B047}">
   <ds:schemaRefs>
     <ds:schemaRef ds:uri="8b5aa52d-55c6-460f-b140-7d1036289c34"/>
@@ -8895,4 +8880,29 @@
     <ds:schemaRef ds:uri="http://www.w3.org/2001/XMLSchema"/>
   </ds:schemaRefs>
 </ds:datastoreItem>
+</file>
+
+<file path=customXml/itemProps2.xml><?xml version="1.0" encoding="utf-8"?>
+<ds:datastoreItem xmlns:ds="http://schemas.openxmlformats.org/officeDocument/2006/customXml" ds:itemID="{4CC2EA12-2FBF-44D3-A23A-46F0D23AD439}">
+  <ds:schemaRefs>
+    <ds:schemaRef ds:uri="http://schemas.microsoft.com/office/2006/metadata/properties"/>
+    <ds:schemaRef ds:uri="8b5aa52d-55c6-460f-b140-7d1036289c34"/>
+    <ds:schemaRef ds:uri="http://www.w3.org/XML/1998/namespace"/>
+    <ds:schemaRef ds:uri="http://schemas.openxmlformats.org/package/2006/metadata/core-properties"/>
+    <ds:schemaRef ds:uri="http://purl.org/dc/dcmitype/"/>
+    <ds:schemaRef ds:uri="http://schemas.microsoft.com/office/2006/documentManagement/types"/>
+    <ds:schemaRef ds:uri="http://purl.org/dc/elements/1.1/"/>
+    <ds:schemaRef ds:uri="http://schemas.microsoft.com/office/infopath/2007/PartnerControls"/>
+    <ds:schemaRef ds:uri="a7a475fa-823d-4b6d-a5c9-7ed2d4452183"/>
+    <ds:schemaRef ds:uri="http://purl.org/dc/terms/"/>
+  </ds:schemaRefs>
+</ds:datastoreItem>
+</file>
+
+<file path=customXml/itemProps3.xml><?xml version="1.0" encoding="utf-8"?>
+<ds:datastoreItem xmlns:ds="http://schemas.openxmlformats.org/officeDocument/2006/customXml" ds:itemID="{92EFAD2A-D7B7-489C-B42D-5915B3A4998D}">
+  <ds:schemaRefs>
+    <ds:schemaRef ds:uri="http://schemas.microsoft.com/sharepoint/v3/contenttype/forms"/>
+  </ds:schemaRefs>
+</ds:datastoreItem>
 </file>
</xml_diff>

<commit_message>
fix: 7.1 and 7.2
</commit_message>
<xml_diff>
--- a/Documents/Poster Capstone_Hiriart Corales Samaniego.pptx
+++ b/Documents/Poster Capstone_Hiriart Corales Samaniego.pptx
@@ -255,7 +255,7 @@
           <a:p>
             <a:fld id="{12C71A99-0B13-4396-9EE6-7D91949CF6D1}" type="datetimeFigureOut">
               <a:rPr lang="es-EC" smtClean="0"/>
-              <a:t>28/7/2023</a:t>
+              <a:t>30/7/2023</a:t>
             </a:fld>
             <a:endParaRPr lang="es-EC"/>
           </a:p>
@@ -425,7 +425,7 @@
           <a:p>
             <a:fld id="{12C71A99-0B13-4396-9EE6-7D91949CF6D1}" type="datetimeFigureOut">
               <a:rPr lang="es-EC" smtClean="0"/>
-              <a:t>28/7/2023</a:t>
+              <a:t>30/7/2023</a:t>
             </a:fld>
             <a:endParaRPr lang="es-EC"/>
           </a:p>
@@ -605,7 +605,7 @@
           <a:p>
             <a:fld id="{12C71A99-0B13-4396-9EE6-7D91949CF6D1}" type="datetimeFigureOut">
               <a:rPr lang="es-EC" smtClean="0"/>
-              <a:t>28/7/2023</a:t>
+              <a:t>30/7/2023</a:t>
             </a:fld>
             <a:endParaRPr lang="es-EC"/>
           </a:p>
@@ -775,7 +775,7 @@
           <a:p>
             <a:fld id="{12C71A99-0B13-4396-9EE6-7D91949CF6D1}" type="datetimeFigureOut">
               <a:rPr lang="es-EC" smtClean="0"/>
-              <a:t>28/7/2023</a:t>
+              <a:t>30/7/2023</a:t>
             </a:fld>
             <a:endParaRPr lang="es-EC"/>
           </a:p>
@@ -1021,7 +1021,7 @@
           <a:p>
             <a:fld id="{12C71A99-0B13-4396-9EE6-7D91949CF6D1}" type="datetimeFigureOut">
               <a:rPr lang="es-EC" smtClean="0"/>
-              <a:t>28/7/2023</a:t>
+              <a:t>30/7/2023</a:t>
             </a:fld>
             <a:endParaRPr lang="es-EC"/>
           </a:p>
@@ -1253,7 +1253,7 @@
           <a:p>
             <a:fld id="{12C71A99-0B13-4396-9EE6-7D91949CF6D1}" type="datetimeFigureOut">
               <a:rPr lang="es-EC" smtClean="0"/>
-              <a:t>28/7/2023</a:t>
+              <a:t>30/7/2023</a:t>
             </a:fld>
             <a:endParaRPr lang="es-EC"/>
           </a:p>
@@ -1620,7 +1620,7 @@
           <a:p>
             <a:fld id="{12C71A99-0B13-4396-9EE6-7D91949CF6D1}" type="datetimeFigureOut">
               <a:rPr lang="es-EC" smtClean="0"/>
-              <a:t>28/7/2023</a:t>
+              <a:t>30/7/2023</a:t>
             </a:fld>
             <a:endParaRPr lang="es-EC"/>
           </a:p>
@@ -1738,7 +1738,7 @@
           <a:p>
             <a:fld id="{12C71A99-0B13-4396-9EE6-7D91949CF6D1}" type="datetimeFigureOut">
               <a:rPr lang="es-EC" smtClean="0"/>
-              <a:t>28/7/2023</a:t>
+              <a:t>30/7/2023</a:t>
             </a:fld>
             <a:endParaRPr lang="es-EC"/>
           </a:p>
@@ -1833,7 +1833,7 @@
           <a:p>
             <a:fld id="{12C71A99-0B13-4396-9EE6-7D91949CF6D1}" type="datetimeFigureOut">
               <a:rPr lang="es-EC" smtClean="0"/>
-              <a:t>28/7/2023</a:t>
+              <a:t>30/7/2023</a:t>
             </a:fld>
             <a:endParaRPr lang="es-EC"/>
           </a:p>
@@ -2110,7 +2110,7 @@
           <a:p>
             <a:fld id="{12C71A99-0B13-4396-9EE6-7D91949CF6D1}" type="datetimeFigureOut">
               <a:rPr lang="es-EC" smtClean="0"/>
-              <a:t>28/7/2023</a:t>
+              <a:t>30/7/2023</a:t>
             </a:fld>
             <a:endParaRPr lang="es-EC"/>
           </a:p>
@@ -2367,7 +2367,7 @@
           <a:p>
             <a:fld id="{12C71A99-0B13-4396-9EE6-7D91949CF6D1}" type="datetimeFigureOut">
               <a:rPr lang="es-EC" smtClean="0"/>
-              <a:t>28/7/2023</a:t>
+              <a:t>30/7/2023</a:t>
             </a:fld>
             <a:endParaRPr lang="es-EC"/>
           </a:p>
@@ -2580,7 +2580,7 @@
           <a:p>
             <a:fld id="{12C71A99-0B13-4396-9EE6-7D91949CF6D1}" type="datetimeFigureOut">
               <a:rPr lang="es-EC" smtClean="0"/>
-              <a:t>28/7/2023</a:t>
+              <a:t>30/7/2023</a:t>
             </a:fld>
             <a:endParaRPr lang="es-EC"/>
           </a:p>
@@ -3509,7 +3509,7 @@
         <p:spPr>
           <a:xfrm>
             <a:off x="1502940" y="8499599"/>
-            <a:ext cx="13860000" cy="1969770"/>
+            <a:ext cx="13860000" cy="1477328"/>
           </a:xfrm>
           <a:prstGeom prst="rect">
             <a:avLst/>
@@ -3531,7 +3531,7 @@
                 <a:latin typeface="Calibri"/>
                 <a:cs typeface="Calibri"/>
               </a:rPr>
-              <a:t>Desarrollar una aplicación web, con un módulo de inteligencia artificial que detecte posibles errores, y una máquina de puntaje con temporizador, para apoyar la gestión de datos de entrenamiento de esgrima en la Academia de Esgrima Ciudad de Quito</a:t>
+              <a:t>Desarrollar una aplicación web, con un módulo de inteligencia artificial que detecte posibles errores, y una máquina de puntaje con temporizador, para apoyar la gestión de datos de entrenamiento en la Academia de Esgrima Ciudad de Quito</a:t>
             </a:r>
             <a:r>
               <a:rPr lang="es-ES" sz="3200" dirty="0">
@@ -5997,7 +5997,21 @@
                 <a:ea typeface="+mn-lt"/>
                 <a:cs typeface="+mn-lt"/>
               </a:rPr>
-              <a:t>Develop a web application, with an artificial intelligence module that detects possible errors, and a scoring machine with a timer, in order to support the management of fencing training data for </a:t>
+              <a:t>Develop a web application, with an artificial intelligence module that detects possible errors, and a scoring machine with a timer, in order to support the </a:t>
+            </a:r>
+            <a:r>
+              <a:rPr lang="en-US" sz="3200">
+                <a:ea typeface="+mn-lt"/>
+                <a:cs typeface="+mn-lt"/>
+              </a:rPr>
+              <a:t>management of training </a:t>
+            </a:r>
+            <a:r>
+              <a:rPr lang="en-US" sz="3200" dirty="0">
+                <a:ea typeface="+mn-lt"/>
+                <a:cs typeface="+mn-lt"/>
+              </a:rPr>
+              <a:t>data for </a:t>
             </a:r>
             <a:r>
               <a:rPr lang="en-US" sz="3200" i="1" dirty="0">
@@ -8606,6 +8620,23 @@
 </file>
 
 <file path=customXml/item1.xml><?xml version="1.0" encoding="utf-8"?>
+<?mso-contentType ?>
+<FormTemplates xmlns="http://schemas.microsoft.com/sharepoint/v3/contenttype/forms">
+  <Display>DocumentLibraryForm</Display>
+  <Edit>DocumentLibraryForm</Edit>
+  <New>DocumentLibraryForm</New>
+</FormTemplates>
+</file>
+
+<file path=customXml/item2.xml><?xml version="1.0" encoding="utf-8"?>
+<p:properties xmlns:p="http://schemas.microsoft.com/office/2006/metadata/properties" xmlns:xsi="http://www.w3.org/2001/XMLSchema-instance" xmlns:pc="http://schemas.microsoft.com/office/infopath/2007/PartnerControls">
+  <documentManagement>
+    <_activity xmlns="8b5aa52d-55c6-460f-b140-7d1036289c34" xsi:nil="true"/>
+  </documentManagement>
+</p:properties>
+</file>
+
+<file path=customXml/item3.xml><?xml version="1.0" encoding="utf-8"?>
 <ct:contentTypeSchema xmlns:ct="http://schemas.microsoft.com/office/2006/metadata/contentType" xmlns:ma="http://schemas.microsoft.com/office/2006/metadata/properties/metaAttributes" ct:_="" ma:_="" ma:contentTypeName="Document" ma:contentTypeID="0x0101005607B7EB9064FA4898B578FABE8FD918" ma:contentTypeVersion="16" ma:contentTypeDescription="Create a new document." ma:contentTypeScope="" ma:versionID="56d91f5f361719270891a2c0e8fd174b">
   <xsd:schema xmlns:xsd="http://www.w3.org/2001/XMLSchema" xmlns:xs="http://www.w3.org/2001/XMLSchema" xmlns:p="http://schemas.microsoft.com/office/2006/metadata/properties" xmlns:ns3="8b5aa52d-55c6-460f-b140-7d1036289c34" xmlns:ns4="a7a475fa-823d-4b6d-a5c9-7ed2d4452183" targetNamespace="http://schemas.microsoft.com/office/2006/metadata/properties" ma:root="true" ma:fieldsID="0e5a20e0752b682dcd58fb649d4a297c" ns3:_="" ns4:_="">
     <xsd:import namespace="8b5aa52d-55c6-460f-b140-7d1036289c34"/>
@@ -8846,24 +8877,32 @@
 </ct:contentTypeSchema>
 </file>
 
-<file path=customXml/item2.xml><?xml version="1.0" encoding="utf-8"?>
-<p:properties xmlns:p="http://schemas.microsoft.com/office/2006/metadata/properties" xmlns:xsi="http://www.w3.org/2001/XMLSchema-instance" xmlns:pc="http://schemas.microsoft.com/office/infopath/2007/PartnerControls">
-  <documentManagement>
-    <_activity xmlns="8b5aa52d-55c6-460f-b140-7d1036289c34" xsi:nil="true"/>
-  </documentManagement>
-</p:properties>
+<file path=customXml/itemProps1.xml><?xml version="1.0" encoding="utf-8"?>
+<ds:datastoreItem xmlns:ds="http://schemas.openxmlformats.org/officeDocument/2006/customXml" ds:itemID="{92EFAD2A-D7B7-489C-B42D-5915B3A4998D}">
+  <ds:schemaRefs>
+    <ds:schemaRef ds:uri="http://schemas.microsoft.com/sharepoint/v3/contenttype/forms"/>
+  </ds:schemaRefs>
+</ds:datastoreItem>
 </file>
 
-<file path=customXml/item3.xml><?xml version="1.0" encoding="utf-8"?>
-<?mso-contentType ?>
-<FormTemplates xmlns="http://schemas.microsoft.com/sharepoint/v3/contenttype/forms">
-  <Display>DocumentLibraryForm</Display>
-  <Edit>DocumentLibraryForm</Edit>
-  <New>DocumentLibraryForm</New>
-</FormTemplates>
+<file path=customXml/itemProps2.xml><?xml version="1.0" encoding="utf-8"?>
+<ds:datastoreItem xmlns:ds="http://schemas.openxmlformats.org/officeDocument/2006/customXml" ds:itemID="{4CC2EA12-2FBF-44D3-A23A-46F0D23AD439}">
+  <ds:schemaRefs>
+    <ds:schemaRef ds:uri="8b5aa52d-55c6-460f-b140-7d1036289c34"/>
+    <ds:schemaRef ds:uri="http://www.w3.org/XML/1998/namespace"/>
+    <ds:schemaRef ds:uri="a7a475fa-823d-4b6d-a5c9-7ed2d4452183"/>
+    <ds:schemaRef ds:uri="http://schemas.openxmlformats.org/package/2006/metadata/core-properties"/>
+    <ds:schemaRef ds:uri="http://schemas.microsoft.com/office/2006/documentManagement/types"/>
+    <ds:schemaRef ds:uri="http://purl.org/dc/elements/1.1/"/>
+    <ds:schemaRef ds:uri="http://purl.org/dc/terms/"/>
+    <ds:schemaRef ds:uri="http://schemas.microsoft.com/office/2006/metadata/properties"/>
+    <ds:schemaRef ds:uri="http://schemas.microsoft.com/office/infopath/2007/PartnerControls"/>
+    <ds:schemaRef ds:uri="http://purl.org/dc/dcmitype/"/>
+  </ds:schemaRefs>
+</ds:datastoreItem>
 </file>
 
-<file path=customXml/itemProps1.xml><?xml version="1.0" encoding="utf-8"?>
+<file path=customXml/itemProps3.xml><?xml version="1.0" encoding="utf-8"?>
 <ds:datastoreItem xmlns:ds="http://schemas.openxmlformats.org/officeDocument/2006/customXml" ds:itemID="{3C36E779-9115-4C7F-AFBC-2B265042B047}">
   <ds:schemaRefs>
     <ds:schemaRef ds:uri="8b5aa52d-55c6-460f-b140-7d1036289c34"/>
@@ -8880,29 +8919,4 @@
     <ds:schemaRef ds:uri="http://www.w3.org/2001/XMLSchema"/>
   </ds:schemaRefs>
 </ds:datastoreItem>
-</file>
-
-<file path=customXml/itemProps2.xml><?xml version="1.0" encoding="utf-8"?>
-<ds:datastoreItem xmlns:ds="http://schemas.openxmlformats.org/officeDocument/2006/customXml" ds:itemID="{4CC2EA12-2FBF-44D3-A23A-46F0D23AD439}">
-  <ds:schemaRefs>
-    <ds:schemaRef ds:uri="http://schemas.microsoft.com/office/2006/metadata/properties"/>
-    <ds:schemaRef ds:uri="8b5aa52d-55c6-460f-b140-7d1036289c34"/>
-    <ds:schemaRef ds:uri="http://www.w3.org/XML/1998/namespace"/>
-    <ds:schemaRef ds:uri="http://schemas.openxmlformats.org/package/2006/metadata/core-properties"/>
-    <ds:schemaRef ds:uri="http://purl.org/dc/dcmitype/"/>
-    <ds:schemaRef ds:uri="http://schemas.microsoft.com/office/2006/documentManagement/types"/>
-    <ds:schemaRef ds:uri="http://purl.org/dc/elements/1.1/"/>
-    <ds:schemaRef ds:uri="http://schemas.microsoft.com/office/infopath/2007/PartnerControls"/>
-    <ds:schemaRef ds:uri="a7a475fa-823d-4b6d-a5c9-7ed2d4452183"/>
-    <ds:schemaRef ds:uri="http://purl.org/dc/terms/"/>
-  </ds:schemaRefs>
-</ds:datastoreItem>
-</file>
-
-<file path=customXml/itemProps3.xml><?xml version="1.0" encoding="utf-8"?>
-<ds:datastoreItem xmlns:ds="http://schemas.openxmlformats.org/officeDocument/2006/customXml" ds:itemID="{92EFAD2A-D7B7-489C-B42D-5915B3A4998D}">
-  <ds:schemaRefs>
-    <ds:schemaRef ds:uri="http://schemas.microsoft.com/sharepoint/v3/contenttype/forms"/>
-  </ds:schemaRefs>
-</ds:datastoreItem>
 </file>
</xml_diff>